<commit_message>
adds ppts for lesson introductions - edison
</commit_message>
<xml_diff>
--- a/edison/01_meet_edison.pptx
+++ b/edison/01_meet_edison.pptx
@@ -5,7 +5,7 @@
     <p:sldMasterId id="2147484031" r:id="rId1"/>
   </p:sldMasterIdLst>
   <p:notesMasterIdLst>
-    <p:notesMasterId r:id="rId7"/>
+    <p:notesMasterId r:id="rId10"/>
   </p:notesMasterIdLst>
   <p:sldIdLst>
     <p:sldId id="256" r:id="rId2"/>
@@ -13,6 +13,9 @@
     <p:sldId id="265" r:id="rId4"/>
     <p:sldId id="267" r:id="rId5"/>
     <p:sldId id="266" r:id="rId6"/>
+    <p:sldId id="268" r:id="rId7"/>
+    <p:sldId id="269" r:id="rId8"/>
+    <p:sldId id="270" r:id="rId9"/>
   </p:sldIdLst>
   <p:sldSz cx="12192000" cy="6858000"/>
   <p:notesSz cx="6858000" cy="9144000"/>
@@ -201,7 +204,7 @@
           <a:p>
             <a:fld id="{B9215387-4CA7-BE46-8B46-BA5CFED08983}" type="datetimeFigureOut">
               <a:rPr lang="en-US" smtClean="0"/>
-              <a:t>8/9/17</a:t>
+              <a:t>8/16/17</a:t>
             </a:fld>
             <a:endParaRPr lang="en-US"/>
           </a:p>
@@ -661,7 +664,7 @@
             <a:fld id="{08B9EBBA-996F-894A-B54A-D6246ED52CEA}" type="datetimeFigureOut">
               <a:rPr lang="en-US" smtClean="0"/>
               <a:pPr/>
-              <a:t>8/9/17</a:t>
+              <a:t>8/16/17</a:t>
             </a:fld>
             <a:endParaRPr lang="en-US" dirty="0"/>
           </a:p>
@@ -868,7 +871,7 @@
             <a:fld id="{C6C52C72-DE31-F449-A4ED-4C594FD91407}" type="datetimeFigureOut">
               <a:rPr lang="en-US" smtClean="0"/>
               <a:pPr/>
-              <a:t>8/9/17</a:t>
+              <a:t>8/16/17</a:t>
             </a:fld>
             <a:endParaRPr lang="en-US" dirty="0"/>
           </a:p>
@@ -1045,7 +1048,7 @@
             <a:fld id="{ED62726E-379B-B349-9EED-81ED093FA806}" type="datetimeFigureOut">
               <a:rPr lang="en-US" smtClean="0"/>
               <a:pPr/>
-              <a:t>8/9/17</a:t>
+              <a:t>8/16/17</a:t>
             </a:fld>
             <a:endParaRPr lang="en-US" dirty="0"/>
           </a:p>
@@ -1212,7 +1215,7 @@
             <a:fld id="{9B3A1323-8D79-1946-B0D7-40001CF92E9D}" type="datetimeFigureOut">
               <a:rPr lang="en-US" smtClean="0"/>
               <a:pPr/>
-              <a:t>8/9/17</a:t>
+              <a:t>8/16/17</a:t>
             </a:fld>
             <a:endParaRPr lang="en-US" dirty="0"/>
           </a:p>
@@ -1463,7 +1466,7 @@
             <a:fld id="{8DFA1846-DA80-1C48-A609-854EA85C59AD}" type="datetimeFigureOut">
               <a:rPr lang="en-US" smtClean="0"/>
               <a:pPr/>
-              <a:t>8/9/17</a:t>
+              <a:t>8/16/17</a:t>
             </a:fld>
             <a:endParaRPr lang="en-US" dirty="0"/>
           </a:p>
@@ -1786,7 +1789,7 @@
             <a:fld id="{57302355-E14B-8545-A8F8-0FE83CC9D524}" type="datetimeFigureOut">
               <a:rPr lang="en-US" smtClean="0"/>
               <a:pPr/>
-              <a:t>8/9/17</a:t>
+              <a:t>8/16/17</a:t>
             </a:fld>
             <a:endParaRPr lang="en-US" dirty="0"/>
           </a:p>
@@ -2239,7 +2242,7 @@
             <a:fld id="{02640F58-564D-2B4F-AE67-E407BA4FCF45}" type="datetimeFigureOut">
               <a:rPr lang="en-US" smtClean="0"/>
               <a:pPr/>
-              <a:t>8/9/17</a:t>
+              <a:t>8/16/17</a:t>
             </a:fld>
             <a:endParaRPr lang="en-US" dirty="0"/>
           </a:p>
@@ -2359,7 +2362,7 @@
             <a:fld id="{F13A34C8-038E-2045-AF43-DF7DBB8E0E9E}" type="datetimeFigureOut">
               <a:rPr lang="en-US" smtClean="0"/>
               <a:pPr/>
-              <a:t>8/9/17</a:t>
+              <a:t>8/16/17</a:t>
             </a:fld>
             <a:endParaRPr lang="en-US" dirty="0"/>
           </a:p>
@@ -2451,7 +2454,7 @@
             <a:fld id="{8818C68F-D26B-8F47-958C-23B49CF8A634}" type="datetimeFigureOut">
               <a:rPr lang="en-US" smtClean="0"/>
               <a:pPr/>
-              <a:t>8/9/17</a:t>
+              <a:t>8/16/17</a:t>
             </a:fld>
             <a:endParaRPr lang="en-US" dirty="0"/>
           </a:p>
@@ -2735,7 +2738,7 @@
             <a:fld id="{D0DF5E60-9974-AC48-9591-99C2BB44B7CF}" type="datetimeFigureOut">
               <a:rPr lang="en-US" smtClean="0"/>
               <a:pPr/>
-              <a:t>8/9/17</a:t>
+              <a:t>8/16/17</a:t>
             </a:fld>
             <a:endParaRPr lang="en-US" dirty="0"/>
           </a:p>
@@ -3055,7 +3058,7 @@
             <a:fld id="{18C79C5D-2A6F-F04D-97DA-BEF2467B64E4}" type="datetimeFigureOut">
               <a:rPr lang="en-US" smtClean="0"/>
               <a:pPr/>
-              <a:t>8/9/17</a:t>
+              <a:t>8/16/17</a:t>
             </a:fld>
             <a:endParaRPr lang="en-US" dirty="0"/>
           </a:p>
@@ -3309,7 +3312,7 @@
             <a:fld id="{09B482E8-6E0E-1B4F-B1FD-C69DB9E858D9}" type="datetimeFigureOut">
               <a:rPr lang="en-US" smtClean="0"/>
               <a:pPr/>
-              <a:t>8/9/17</a:t>
+              <a:t>8/16/17</a:t>
             </a:fld>
             <a:endParaRPr lang="en-US" dirty="0"/>
           </a:p>
@@ -3934,9 +3937,26 @@
           <a:bodyPr/>
           <a:lstStyle/>
           <a:p>
-            <a:endParaRPr lang="en-US" dirty="0" smtClean="0"/>
-          </a:p>
-          <a:p>
+            <a:r>
+              <a:rPr lang="en-US" dirty="0" smtClean="0"/>
+              <a:t>Note the nuances of programming in Python</a:t>
+            </a:r>
+          </a:p>
+          <a:p>
+            <a:r>
+              <a:rPr lang="en-US" dirty="0" smtClean="0"/>
+              <a:t>Explore the documentation for Edison Programming</a:t>
+            </a:r>
+          </a:p>
+          <a:p>
+            <a:r>
+              <a:rPr lang="en-US" dirty="0" smtClean="0"/>
+              <a:t>Set a goal for your program and then figure out how </a:t>
+            </a:r>
+            <a:r>
+              <a:rPr lang="en-US" smtClean="0"/>
+              <a:t>to accomplish it.</a:t>
+            </a:r>
             <a:endParaRPr lang="en-US" dirty="0" smtClean="0"/>
           </a:p>
         </p:txBody>
@@ -4645,6 +4665,817 @@
     <p:extLst>
       <p:ext uri="{BB962C8B-B14F-4D97-AF65-F5344CB8AC3E}">
         <p14:creationId xmlns:p14="http://schemas.microsoft.com/office/powerpoint/2010/main" val="2513704207"/>
+      </p:ext>
+    </p:extLst>
+  </p:cSld>
+  <p:clrMapOvr>
+    <a:masterClrMapping/>
+  </p:clrMapOvr>
+  <p:timing>
+    <p:tnLst>
+      <p:par>
+        <p:cTn id="1" dur="indefinite" restart="never" nodeType="tmRoot"/>
+      </p:par>
+    </p:tnLst>
+  </p:timing>
+</p:sld>
+</file>
+
+<file path=ppt/slides/slide6.xml><?xml version="1.0" encoding="utf-8"?>
+<p:sld xmlns:a="http://schemas.openxmlformats.org/drawingml/2006/main" xmlns:r="http://schemas.openxmlformats.org/officeDocument/2006/relationships" xmlns:p="http://schemas.openxmlformats.org/presentationml/2006/main">
+  <p:cSld>
+    <p:spTree>
+      <p:nvGrpSpPr>
+        <p:cNvPr id="1" name=""/>
+        <p:cNvGrpSpPr/>
+        <p:nvPr/>
+      </p:nvGrpSpPr>
+      <p:grpSpPr>
+        <a:xfrm>
+          <a:off x="0" y="0"/>
+          <a:ext cx="0" cy="0"/>
+          <a:chOff x="0" y="0"/>
+          <a:chExt cx="0" cy="0"/>
+        </a:xfrm>
+      </p:grpSpPr>
+      <p:sp>
+        <p:nvSpPr>
+          <p:cNvPr id="2" name="Title 1"/>
+          <p:cNvSpPr>
+            <a:spLocks noGrp="1"/>
+          </p:cNvSpPr>
+          <p:nvPr>
+            <p:ph type="title"/>
+          </p:nvPr>
+        </p:nvSpPr>
+        <p:spPr>
+          <a:xfrm>
+            <a:off x="485023" y="343415"/>
+            <a:ext cx="9692640" cy="1428929"/>
+          </a:xfrm>
+        </p:spPr>
+        <p:txBody>
+          <a:bodyPr/>
+          <a:lstStyle/>
+          <a:p>
+            <a:r>
+              <a:rPr lang="en-US" dirty="0" smtClean="0"/>
+              <a:t>Programming </a:t>
+            </a:r>
+            <a:br>
+              <a:rPr lang="en-US" dirty="0" smtClean="0"/>
+            </a:br>
+            <a:r>
+              <a:rPr lang="en-US" dirty="0" smtClean="0"/>
+              <a:t>Edison</a:t>
+            </a:r>
+            <a:endParaRPr lang="en-US" dirty="0"/>
+          </a:p>
+        </p:txBody>
+      </p:sp>
+      <p:sp>
+        <p:nvSpPr>
+          <p:cNvPr id="3" name="Content Placeholder 2"/>
+          <p:cNvSpPr>
+            <a:spLocks noGrp="1"/>
+          </p:cNvSpPr>
+          <p:nvPr>
+            <p:ph sz="half" idx="1"/>
+          </p:nvPr>
+        </p:nvSpPr>
+        <p:spPr>
+          <a:xfrm>
+            <a:off x="485022" y="1909822"/>
+            <a:ext cx="4931929" cy="4351337"/>
+          </a:xfrm>
+        </p:spPr>
+        <p:txBody>
+          <a:bodyPr/>
+          <a:lstStyle/>
+          <a:p>
+            <a:r>
+              <a:rPr lang="en-US" dirty="0" smtClean="0"/>
+              <a:t>Edison sure seems confused in Test_Program!</a:t>
+            </a:r>
+          </a:p>
+          <a:p>
+            <a:r>
+              <a:rPr lang="en-US" dirty="0" smtClean="0"/>
+              <a:t>Explore how the program works by looking at the documentation for each method used</a:t>
+            </a:r>
+          </a:p>
+          <a:p>
+            <a:pPr lvl="1"/>
+            <a:r>
+              <a:rPr lang="en-US" dirty="0" err="1" smtClean="0">
+                <a:solidFill>
+                  <a:schemeClr val="accent4">
+                    <a:lumMod val="75000"/>
+                  </a:schemeClr>
+                </a:solidFill>
+                <a:latin typeface="Courier" charset="0"/>
+                <a:ea typeface="Courier" charset="0"/>
+                <a:cs typeface="Courier" charset="0"/>
+              </a:rPr>
+              <a:t>Ed</a:t>
+            </a:r>
+            <a:r>
+              <a:rPr lang="en-US" dirty="0" err="1" smtClean="0">
+                <a:latin typeface="Courier" charset="0"/>
+                <a:ea typeface="Courier" charset="0"/>
+                <a:cs typeface="Courier" charset="0"/>
+              </a:rPr>
+              <a:t>.PlayBeep</a:t>
+            </a:r>
+            <a:r>
+              <a:rPr lang="en-US" dirty="0" smtClean="0">
+                <a:latin typeface="Courier" charset="0"/>
+                <a:ea typeface="Courier" charset="0"/>
+                <a:cs typeface="Courier" charset="0"/>
+              </a:rPr>
+              <a:t>()</a:t>
+            </a:r>
+          </a:p>
+          <a:p>
+            <a:pPr lvl="1"/>
+            <a:r>
+              <a:rPr lang="en-US" dirty="0" err="1" smtClean="0">
+                <a:solidFill>
+                  <a:schemeClr val="accent4">
+                    <a:lumMod val="75000"/>
+                  </a:schemeClr>
+                </a:solidFill>
+                <a:latin typeface="Courier" charset="0"/>
+                <a:ea typeface="Courier" charset="0"/>
+                <a:cs typeface="Courier" charset="0"/>
+              </a:rPr>
+              <a:t>Ed</a:t>
+            </a:r>
+            <a:r>
+              <a:rPr lang="en-US" dirty="0" err="1" smtClean="0">
+                <a:latin typeface="Courier" charset="0"/>
+                <a:ea typeface="Courier" charset="0"/>
+                <a:cs typeface="Courier" charset="0"/>
+              </a:rPr>
+              <a:t>.LeftLed</a:t>
+            </a:r>
+            <a:r>
+              <a:rPr lang="en-US" dirty="0" smtClean="0">
+                <a:latin typeface="Courier" charset="0"/>
+                <a:ea typeface="Courier" charset="0"/>
+                <a:cs typeface="Courier" charset="0"/>
+              </a:rPr>
+              <a:t>()</a:t>
+            </a:r>
+          </a:p>
+          <a:p>
+            <a:pPr lvl="1"/>
+            <a:r>
+              <a:rPr lang="en-US" dirty="0" err="1" smtClean="0">
+                <a:solidFill>
+                  <a:schemeClr val="accent4">
+                    <a:lumMod val="75000"/>
+                  </a:schemeClr>
+                </a:solidFill>
+                <a:latin typeface="Courier" charset="0"/>
+                <a:ea typeface="Courier" charset="0"/>
+                <a:cs typeface="Courier" charset="0"/>
+              </a:rPr>
+              <a:t>Ed</a:t>
+            </a:r>
+            <a:r>
+              <a:rPr lang="en-US" dirty="0" err="1" smtClean="0">
+                <a:latin typeface="Courier" charset="0"/>
+                <a:ea typeface="Courier" charset="0"/>
+                <a:cs typeface="Courier" charset="0"/>
+              </a:rPr>
+              <a:t>.RightLed</a:t>
+            </a:r>
+            <a:r>
+              <a:rPr lang="en-US" dirty="0" smtClean="0">
+                <a:latin typeface="Courier" charset="0"/>
+                <a:ea typeface="Courier" charset="0"/>
+                <a:cs typeface="Courier" charset="0"/>
+              </a:rPr>
+              <a:t>()</a:t>
+            </a:r>
+          </a:p>
+          <a:p>
+            <a:pPr lvl="1"/>
+            <a:r>
+              <a:rPr lang="en-US" dirty="0" err="1" smtClean="0">
+                <a:solidFill>
+                  <a:schemeClr val="accent4">
+                    <a:lumMod val="75000"/>
+                  </a:schemeClr>
+                </a:solidFill>
+                <a:latin typeface="Courier" charset="0"/>
+                <a:ea typeface="Courier" charset="0"/>
+                <a:cs typeface="Courier" charset="0"/>
+              </a:rPr>
+              <a:t>Ed</a:t>
+            </a:r>
+            <a:r>
+              <a:rPr lang="en-US" dirty="0" err="1" smtClean="0">
+                <a:latin typeface="Courier" charset="0"/>
+                <a:ea typeface="Courier" charset="0"/>
+                <a:cs typeface="Courier" charset="0"/>
+              </a:rPr>
+              <a:t>.Drive</a:t>
+            </a:r>
+            <a:r>
+              <a:rPr lang="en-US" dirty="0" smtClean="0">
+                <a:latin typeface="Courier" charset="0"/>
+                <a:ea typeface="Courier" charset="0"/>
+                <a:cs typeface="Courier" charset="0"/>
+              </a:rPr>
+              <a:t>()</a:t>
+            </a:r>
+          </a:p>
+          <a:p>
+            <a:pPr lvl="1"/>
+            <a:r>
+              <a:rPr lang="en-US" dirty="0" err="1" smtClean="0">
+                <a:solidFill>
+                  <a:schemeClr val="accent4">
+                    <a:lumMod val="75000"/>
+                  </a:schemeClr>
+                </a:solidFill>
+                <a:latin typeface="Courier" charset="0"/>
+                <a:ea typeface="Courier" charset="0"/>
+                <a:cs typeface="Courier" charset="0"/>
+              </a:rPr>
+              <a:t>Ed</a:t>
+            </a:r>
+            <a:r>
+              <a:rPr lang="en-US" dirty="0" err="1" smtClean="0">
+                <a:latin typeface="Courier" charset="0"/>
+                <a:ea typeface="Courier" charset="0"/>
+                <a:cs typeface="Courier" charset="0"/>
+              </a:rPr>
+              <a:t>.TimeWait</a:t>
+            </a:r>
+            <a:r>
+              <a:rPr lang="en-US" dirty="0" smtClean="0">
+                <a:latin typeface="Courier" charset="0"/>
+                <a:ea typeface="Courier" charset="0"/>
+                <a:cs typeface="Courier" charset="0"/>
+              </a:rPr>
+              <a:t>()</a:t>
+            </a:r>
+            <a:endParaRPr lang="en-US" dirty="0" smtClean="0"/>
+          </a:p>
+          <a:p>
+            <a:endParaRPr lang="en-US" dirty="0" smtClean="0">
+              <a:latin typeface="Courier" charset="0"/>
+              <a:ea typeface="Courier" charset="0"/>
+              <a:cs typeface="Courier" charset="0"/>
+            </a:endParaRPr>
+          </a:p>
+        </p:txBody>
+      </p:sp>
+      <p:pic>
+        <p:nvPicPr>
+          <p:cNvPr id="5" name="Picture 4"/>
+          <p:cNvPicPr>
+            <a:picLocks noChangeAspect="1"/>
+          </p:cNvPicPr>
+          <p:nvPr/>
+        </p:nvPicPr>
+        <p:blipFill>
+          <a:blip r:embed="rId2">
+            <a:extLst>
+              <a:ext uri="{28A0092B-C50C-407E-A947-70E740481C1C}">
+                <a14:useLocalDpi xmlns:a14="http://schemas.microsoft.com/office/drawing/2010/main" val="0"/>
+              </a:ext>
+            </a:extLst>
+          </a:blip>
+          <a:stretch>
+            <a:fillRect/>
+          </a:stretch>
+        </p:blipFill>
+        <p:spPr>
+          <a:xfrm>
+            <a:off x="5490839" y="-46300"/>
+            <a:ext cx="5958139" cy="6979534"/>
+          </a:xfrm>
+          <a:prstGeom prst="rect">
+            <a:avLst/>
+          </a:prstGeom>
+        </p:spPr>
+      </p:pic>
+      <p:sp>
+        <p:nvSpPr>
+          <p:cNvPr id="4" name="Content Placeholder 3"/>
+          <p:cNvSpPr>
+            <a:spLocks noGrp="1"/>
+          </p:cNvSpPr>
+          <p:nvPr>
+            <p:ph sz="half" idx="2"/>
+          </p:nvPr>
+        </p:nvSpPr>
+        <p:spPr>
+          <a:xfrm>
+            <a:off x="8880329" y="3318114"/>
+            <a:ext cx="3122618" cy="1381212"/>
+          </a:xfrm>
+          <a:solidFill>
+            <a:schemeClr val="accent2">
+              <a:lumMod val="20000"/>
+              <a:lumOff val="80000"/>
+            </a:schemeClr>
+          </a:solidFill>
+          <a:ln>
+            <a:solidFill>
+              <a:schemeClr val="accent1"/>
+            </a:solidFill>
+          </a:ln>
+        </p:spPr>
+        <p:txBody>
+          <a:bodyPr anchor="ctr">
+            <a:normAutofit/>
+          </a:bodyPr>
+          <a:lstStyle/>
+          <a:p>
+            <a:pPr marL="0" indent="0" algn="ctr">
+              <a:buNone/>
+            </a:pPr>
+            <a:r>
+              <a:rPr lang="en-US" sz="1600" dirty="0">
+                <a:sym typeface="Wingdings"/>
+              </a:rPr>
+              <a:t>How does </a:t>
+            </a:r>
+            <a:r>
+              <a:rPr lang="en-US" sz="1600" dirty="0" smtClean="0">
+                <a:sym typeface="Wingdings"/>
+              </a:rPr>
+              <a:t>Python look </a:t>
+            </a:r>
+            <a:r>
+              <a:rPr lang="en-US" sz="1600" dirty="0">
+                <a:sym typeface="Wingdings"/>
+              </a:rPr>
+              <a:t>similar to </a:t>
+            </a:r>
+            <a:r>
+              <a:rPr lang="en-US" sz="1600" dirty="0" smtClean="0">
+                <a:sym typeface="Wingdings"/>
+              </a:rPr>
+              <a:t>Arduino (C</a:t>
+            </a:r>
+            <a:r>
+              <a:rPr lang="en-US" sz="1600" smtClean="0">
+                <a:sym typeface="Wingdings"/>
+              </a:rPr>
+              <a:t>++) and </a:t>
+            </a:r>
+            <a:r>
+              <a:rPr lang="en-US" sz="1600" dirty="0" smtClean="0">
+                <a:sym typeface="Wingdings"/>
+              </a:rPr>
+              <a:t>p5.js (JavaScript) languages?</a:t>
+            </a:r>
+            <a:endParaRPr lang="en-US" sz="1600" dirty="0">
+              <a:sym typeface="Wingdings"/>
+            </a:endParaRPr>
+          </a:p>
+          <a:p>
+            <a:pPr marL="0" indent="0" algn="ctr">
+              <a:buNone/>
+            </a:pPr>
+            <a:r>
+              <a:rPr lang="en-US" sz="1600" dirty="0">
+                <a:sym typeface="Wingdings"/>
+              </a:rPr>
+              <a:t>How does it look different</a:t>
+            </a:r>
+            <a:r>
+              <a:rPr lang="en-US" sz="1600" dirty="0" smtClean="0">
+                <a:sym typeface="Wingdings"/>
+              </a:rPr>
+              <a:t>?</a:t>
+            </a:r>
+            <a:endParaRPr lang="en-US" sz="1600" dirty="0">
+              <a:sym typeface="Wingdings"/>
+            </a:endParaRPr>
+          </a:p>
+        </p:txBody>
+      </p:sp>
+    </p:spTree>
+    <p:extLst>
+      <p:ext uri="{BB962C8B-B14F-4D97-AF65-F5344CB8AC3E}">
+        <p14:creationId xmlns:p14="http://schemas.microsoft.com/office/powerpoint/2010/main" val="813445031"/>
+      </p:ext>
+    </p:extLst>
+  </p:cSld>
+  <p:clrMapOvr>
+    <a:masterClrMapping/>
+  </p:clrMapOvr>
+  <p:timing>
+    <p:tnLst>
+      <p:par>
+        <p:cTn id="1" dur="indefinite" restart="never" nodeType="tmRoot"/>
+      </p:par>
+    </p:tnLst>
+  </p:timing>
+</p:sld>
+</file>
+
+<file path=ppt/slides/slide7.xml><?xml version="1.0" encoding="utf-8"?>
+<p:sld xmlns:a="http://schemas.openxmlformats.org/drawingml/2006/main" xmlns:r="http://schemas.openxmlformats.org/officeDocument/2006/relationships" xmlns:p="http://schemas.openxmlformats.org/presentationml/2006/main">
+  <p:cSld>
+    <p:spTree>
+      <p:nvGrpSpPr>
+        <p:cNvPr id="1" name=""/>
+        <p:cNvGrpSpPr/>
+        <p:nvPr/>
+      </p:nvGrpSpPr>
+      <p:grpSpPr>
+        <a:xfrm>
+          <a:off x="0" y="0"/>
+          <a:ext cx="0" cy="0"/>
+          <a:chOff x="0" y="0"/>
+          <a:chExt cx="0" cy="0"/>
+        </a:xfrm>
+      </p:grpSpPr>
+      <p:sp>
+        <p:nvSpPr>
+          <p:cNvPr id="2" name="Title 1"/>
+          <p:cNvSpPr>
+            <a:spLocks noGrp="1"/>
+          </p:cNvSpPr>
+          <p:nvPr>
+            <p:ph type="title"/>
+          </p:nvPr>
+        </p:nvSpPr>
+        <p:spPr/>
+        <p:txBody>
+          <a:bodyPr/>
+          <a:lstStyle/>
+          <a:p>
+            <a:r>
+              <a:rPr lang="en-US" dirty="0" smtClean="0"/>
+              <a:t>Explore Edison Programming</a:t>
+            </a:r>
+            <a:endParaRPr lang="en-US" dirty="0"/>
+          </a:p>
+        </p:txBody>
+      </p:sp>
+      <p:sp>
+        <p:nvSpPr>
+          <p:cNvPr id="3" name="Content Placeholder 2"/>
+          <p:cNvSpPr>
+            <a:spLocks noGrp="1"/>
+          </p:cNvSpPr>
+          <p:nvPr>
+            <p:ph idx="1"/>
+          </p:nvPr>
+        </p:nvSpPr>
+        <p:spPr/>
+        <p:txBody>
+          <a:bodyPr/>
+          <a:lstStyle/>
+          <a:p>
+            <a:pPr marL="457200" indent="-457200">
+              <a:buFont typeface="+mj-lt"/>
+              <a:buAutoNum type="arabicPeriod"/>
+            </a:pPr>
+            <a:r>
+              <a:rPr lang="en-US" dirty="0"/>
+              <a:t>Make Edison drive </a:t>
+            </a:r>
+            <a:r>
+              <a:rPr lang="en-US" dirty="0" smtClean="0"/>
+              <a:t>in a square shape.</a:t>
+            </a:r>
+            <a:endParaRPr lang="en-US" dirty="0"/>
+          </a:p>
+          <a:p>
+            <a:pPr marL="457200" indent="-457200">
+              <a:buFont typeface="+mj-lt"/>
+              <a:buAutoNum type="arabicPeriod"/>
+            </a:pPr>
+            <a:r>
+              <a:rPr lang="en-US" dirty="0"/>
+              <a:t>Make Edison beep every time he turns in the NW corner of the square.</a:t>
+            </a:r>
+          </a:p>
+          <a:p>
+            <a:pPr marL="457200" indent="-457200">
+              <a:buFont typeface="+mj-lt"/>
+              <a:buAutoNum type="arabicPeriod"/>
+            </a:pPr>
+            <a:r>
+              <a:rPr lang="en-US" dirty="0"/>
+              <a:t>Make Edison flash his lights every time he turns in the NE corner of the square.</a:t>
+            </a:r>
+          </a:p>
+          <a:p>
+            <a:endParaRPr lang="en-US" dirty="0"/>
+          </a:p>
+        </p:txBody>
+      </p:sp>
+    </p:spTree>
+    <p:extLst>
+      <p:ext uri="{BB962C8B-B14F-4D97-AF65-F5344CB8AC3E}">
+        <p14:creationId xmlns:p14="http://schemas.microsoft.com/office/powerpoint/2010/main" val="1526998227"/>
+      </p:ext>
+    </p:extLst>
+  </p:cSld>
+  <p:clrMapOvr>
+    <a:masterClrMapping/>
+  </p:clrMapOvr>
+  <p:timing>
+    <p:tnLst>
+      <p:par>
+        <p:cTn id="1" dur="indefinite" restart="never" nodeType="tmRoot"/>
+      </p:par>
+    </p:tnLst>
+  </p:timing>
+</p:sld>
+</file>
+
+<file path=ppt/slides/slide8.xml><?xml version="1.0" encoding="utf-8"?>
+<p:sld xmlns:a="http://schemas.openxmlformats.org/drawingml/2006/main" xmlns:r="http://schemas.openxmlformats.org/officeDocument/2006/relationships" xmlns:p="http://schemas.openxmlformats.org/presentationml/2006/main">
+  <p:cSld>
+    <p:spTree>
+      <p:nvGrpSpPr>
+        <p:cNvPr id="1" name=""/>
+        <p:cNvGrpSpPr/>
+        <p:nvPr/>
+      </p:nvGrpSpPr>
+      <p:grpSpPr>
+        <a:xfrm>
+          <a:off x="0" y="0"/>
+          <a:ext cx="0" cy="0"/>
+          <a:chOff x="0" y="0"/>
+          <a:chExt cx="0" cy="0"/>
+        </a:xfrm>
+      </p:grpSpPr>
+      <p:sp>
+        <p:nvSpPr>
+          <p:cNvPr id="23" name="Rectangle 22"/>
+          <p:cNvSpPr>
+            <a:spLocks noGrp="1" noRot="1" noChangeAspect="1" noMove="1" noResize="1" noEditPoints="1" noAdjustHandles="1" noChangeArrowheads="1" noChangeShapeType="1" noTextEdit="1"/>
+          </p:cNvSpPr>
+          <p:nvPr>
+            <p:extLst>
+              <p:ext uri="{386F3935-93C4-4BCD-93E2-E3B085C9AB24}">
+                <p16:designElem xmlns:p16="http://schemas.microsoft.com/office/powerpoint/2015/main" val="1"/>
+              </p:ext>
+            </p:extLst>
+          </p:nvPr>
+        </p:nvSpPr>
+        <p:spPr bwMode="white">
+          <a:xfrm>
+            <a:off x="0" y="0"/>
+            <a:ext cx="12192000" cy="6858000"/>
+          </a:xfrm>
+          <a:prstGeom prst="rect">
+            <a:avLst/>
+          </a:prstGeom>
+          <a:solidFill>
+            <a:schemeClr val="bg1"/>
+          </a:solidFill>
+          <a:ln>
+            <a:noFill/>
+          </a:ln>
+          <a:effectLst/>
+        </p:spPr>
+      </p:sp>
+      <p:sp>
+        <p:nvSpPr>
+          <p:cNvPr id="25" name="Rectangle 24"/>
+          <p:cNvSpPr>
+            <a:spLocks noGrp="1" noRot="1" noChangeAspect="1" noMove="1" noResize="1" noEditPoints="1" noAdjustHandles="1" noChangeArrowheads="1" noChangeShapeType="1" noTextEdit="1"/>
+          </p:cNvSpPr>
+          <p:nvPr>
+            <p:extLst>
+              <p:ext uri="{386F3935-93C4-4BCD-93E2-E3B085C9AB24}">
+                <p16:designElem xmlns:p16="http://schemas.microsoft.com/office/powerpoint/2015/main" val="1"/>
+              </p:ext>
+            </p:extLst>
+          </p:nvPr>
+        </p:nvSpPr>
+        <p:spPr>
+          <a:xfrm>
+            <a:off x="11292840" y="0"/>
+            <a:ext cx="914400" cy="6858000"/>
+          </a:xfrm>
+          <a:prstGeom prst="rect">
+            <a:avLst/>
+          </a:prstGeom>
+          <a:solidFill>
+            <a:schemeClr val="tx2"/>
+          </a:solidFill>
+          <a:ln>
+            <a:noFill/>
+          </a:ln>
+        </p:spPr>
+        <p:style>
+          <a:lnRef idx="2">
+            <a:schemeClr val="accent1">
+              <a:shade val="50000"/>
+            </a:schemeClr>
+          </a:lnRef>
+          <a:fillRef idx="1">
+            <a:schemeClr val="accent1"/>
+          </a:fillRef>
+          <a:effectRef idx="0">
+            <a:schemeClr val="accent1"/>
+          </a:effectRef>
+          <a:fontRef idx="minor">
+            <a:schemeClr val="lt1"/>
+          </a:fontRef>
+        </p:style>
+      </p:sp>
+      <p:pic>
+        <p:nvPicPr>
+          <p:cNvPr id="7" name="Content Placeholder 6"/>
+          <p:cNvPicPr>
+            <a:picLocks noGrp="1" noChangeAspect="1"/>
+          </p:cNvPicPr>
+          <p:nvPr>
+            <p:ph sz="half" idx="2"/>
+          </p:nvPr>
+        </p:nvPicPr>
+        <p:blipFill rotWithShape="1">
+          <a:blip r:embed="rId2">
+            <a:extLst>
+              <a:ext uri="{28A0092B-C50C-407E-A947-70E740481C1C}">
+                <a14:useLocalDpi xmlns:a14="http://schemas.microsoft.com/office/drawing/2010/main" val="0"/>
+              </a:ext>
+            </a:extLst>
+          </a:blip>
+          <a:srcRect l="13885" t="15869" r="13726" b="2915"/>
+          <a:stretch/>
+        </p:blipFill>
+        <p:spPr>
+          <a:xfrm rot="5400000">
+            <a:off x="900259" y="527550"/>
+            <a:ext cx="4976263" cy="5583125"/>
+          </a:xfrm>
+          <a:prstGeom prst="rect">
+            <a:avLst/>
+          </a:prstGeom>
+          <a:ln>
+            <a:solidFill>
+              <a:schemeClr val="accent1"/>
+            </a:solidFill>
+          </a:ln>
+        </p:spPr>
+      </p:pic>
+      <p:sp>
+        <p:nvSpPr>
+          <p:cNvPr id="4" name="Title 3"/>
+          <p:cNvSpPr>
+            <a:spLocks noGrp="1"/>
+          </p:cNvSpPr>
+          <p:nvPr>
+            <p:ph type="title"/>
+          </p:nvPr>
+        </p:nvSpPr>
+        <p:spPr>
+          <a:xfrm>
+            <a:off x="6420464" y="365760"/>
+            <a:ext cx="4534047" cy="1325562"/>
+          </a:xfrm>
+        </p:spPr>
+        <p:txBody>
+          <a:bodyPr vert="horz" lIns="91440" tIns="27432" rIns="91440" bIns="45720" rtlCol="0" anchor="b">
+            <a:normAutofit/>
+          </a:bodyPr>
+          <a:lstStyle/>
+          <a:p>
+            <a:r>
+              <a:rPr lang="en-US"/>
+              <a:t>Activity: </a:t>
+            </a:r>
+            <a:br>
+              <a:rPr lang="en-US"/>
+            </a:br>
+            <a:r>
+              <a:rPr lang="en-US"/>
+              <a:t>Stay </a:t>
+            </a:r>
+            <a:r>
+              <a:rPr lang="en-US" dirty="0"/>
+              <a:t>on Course</a:t>
+            </a:r>
+          </a:p>
+        </p:txBody>
+      </p:sp>
+      <p:sp>
+        <p:nvSpPr>
+          <p:cNvPr id="5" name="Content Placeholder 4"/>
+          <p:cNvSpPr>
+            <a:spLocks noGrp="1"/>
+          </p:cNvSpPr>
+          <p:nvPr>
+            <p:ph sz="half" idx="1"/>
+          </p:nvPr>
+        </p:nvSpPr>
+        <p:spPr>
+          <a:xfrm>
+            <a:off x="6420463" y="1828800"/>
+            <a:ext cx="4572002" cy="4351337"/>
+          </a:xfrm>
+        </p:spPr>
+        <p:txBody>
+          <a:bodyPr vert="horz" lIns="91440" tIns="45720" rIns="91440" bIns="45720" rtlCol="0">
+            <a:normAutofit fontScale="92500" lnSpcReduction="10000"/>
+          </a:bodyPr>
+          <a:lstStyle/>
+          <a:p>
+            <a:pPr marL="457200">
+              <a:buFont typeface="+mj-lt"/>
+              <a:buAutoNum type="arabicPeriod"/>
+            </a:pPr>
+            <a:r>
+              <a:rPr lang="en-US" dirty="0"/>
+              <a:t>Using a large sheet of paper, draw a course for Edison to follow.</a:t>
+            </a:r>
+          </a:p>
+          <a:p>
+            <a:pPr lvl="2"/>
+            <a:r>
+              <a:rPr lang="en-US" dirty="0"/>
+              <a:t>Only use straightaways and 90 degree turns for this course</a:t>
+            </a:r>
+            <a:r>
+              <a:rPr lang="en-US" dirty="0" smtClean="0"/>
+              <a:t>!</a:t>
+            </a:r>
+          </a:p>
+          <a:p>
+            <a:pPr lvl="2"/>
+            <a:r>
+              <a:rPr lang="en-US" dirty="0" smtClean="0"/>
+              <a:t>Have a starting point (A) and an ending point (B).</a:t>
+            </a:r>
+            <a:endParaRPr lang="en-US" dirty="0"/>
+          </a:p>
+          <a:p>
+            <a:pPr lvl="2"/>
+            <a:r>
+              <a:rPr lang="en-US" dirty="0"/>
+              <a:t>You </a:t>
+            </a:r>
+            <a:r>
+              <a:rPr lang="en-US" dirty="0" smtClean="0"/>
+              <a:t>may </a:t>
+            </a:r>
+            <a:r>
+              <a:rPr lang="en-US" dirty="0"/>
+              <a:t>draw stop signs on the course to indicate that Edison must stop there for at least 1 second!</a:t>
+            </a:r>
+          </a:p>
+          <a:p>
+            <a:pPr marL="457200">
+              <a:buFont typeface="+mj-lt"/>
+              <a:buAutoNum type="arabicPeriod"/>
+            </a:pPr>
+            <a:r>
+              <a:rPr lang="en-US" dirty="0"/>
+              <a:t>Program your Edison to complete your course</a:t>
+            </a:r>
+            <a:r>
+              <a:rPr lang="en-US" dirty="0" smtClean="0"/>
+              <a:t>.</a:t>
+            </a:r>
+          </a:p>
+          <a:p>
+            <a:pPr marL="834390" lvl="1" indent="-285750"/>
+            <a:r>
+              <a:rPr lang="en-US" dirty="0" smtClean="0"/>
+              <a:t>First go (A) to (B)</a:t>
+            </a:r>
+          </a:p>
+          <a:p>
+            <a:pPr marL="834390" lvl="1" indent="-285750"/>
+            <a:r>
+              <a:rPr lang="en-US" dirty="0" smtClean="0"/>
+              <a:t>Then go backwards (B) to (A)</a:t>
+            </a:r>
+            <a:endParaRPr lang="en-US" dirty="0"/>
+          </a:p>
+          <a:p>
+            <a:pPr marL="457200">
+              <a:buFont typeface="+mj-lt"/>
+              <a:buAutoNum type="arabicPeriod"/>
+            </a:pPr>
+            <a:r>
+              <a:rPr lang="en-US" dirty="0"/>
+              <a:t>Trade courses with another team and program that course.</a:t>
+            </a:r>
+          </a:p>
+        </p:txBody>
+      </p:sp>
+    </p:spTree>
+    <p:extLst>
+      <p:ext uri="{BB962C8B-B14F-4D97-AF65-F5344CB8AC3E}">
+        <p14:creationId xmlns:p14="http://schemas.microsoft.com/office/powerpoint/2010/main" val="3339980145"/>
       </p:ext>
     </p:extLst>
   </p:cSld>

</xml_diff>